<commit_message>
codreview and add PPTx
</commit_message>
<xml_diff>
--- a/Решение задачи диаризации методами машинного обучения  ВМК МГУ.pptx
+++ b/Решение задачи диаризации методами машинного обучения  ВМК МГУ.pptx
@@ -13290,7 +13290,7 @@
         <p:spPr>
           <a:xfrm>
             <a:off x="179512" y="2060848"/>
-            <a:ext cx="4752528" cy="2949525"/>
+            <a:ext cx="4752528" cy="2534027"/>
           </a:xfrm>
           <a:prstGeom prst="rect">
             <a:avLst/>
@@ -13317,15 +13317,15 @@
                   <a:srgbClr val="1000CC"/>
                 </a:solidFill>
               </a:rPr>
-              <a:t>С помощью алгоритма Локтя строим модель </a:t>
-            </a:r>
-            <a:r>
-              <a:rPr lang="en-US" dirty="0" err="1">
+              <a:t>С помощью метода Локтя строим модель </a:t>
+            </a:r>
+            <a:r>
+              <a:rPr lang="en-US" dirty="0">
                 <a:solidFill>
                   <a:srgbClr val="1000CC"/>
                 </a:solidFill>
               </a:rPr>
-              <a:t>Kmeans</a:t>
+              <a:t>KMeans</a:t>
             </a:r>
             <a:r>
               <a:rPr lang="ru-RU" dirty="0">
@@ -13390,7 +13390,7 @@
         </p:blipFill>
         <p:spPr>
           <a:xfrm>
-            <a:off x="5436096" y="4216603"/>
+            <a:off x="5436096" y="3429000"/>
             <a:ext cx="2839194" cy="2118513"/>
           </a:xfrm>
           <a:prstGeom prst="rect">
@@ -13420,7 +13420,7 @@
         </p:blipFill>
         <p:spPr>
           <a:xfrm>
-            <a:off x="5436096" y="3545507"/>
+            <a:off x="5436096" y="5547513"/>
             <a:ext cx="2934076" cy="582420"/>
           </a:xfrm>
           <a:prstGeom prst="rect">

</xml_diff>

<commit_message>
Codereview add docs change pptx add audiofiles
</commit_message>
<xml_diff>
--- a/Решение задачи диаризации методами машинного обучения  ВМК МГУ.pptx
+++ b/Решение задачи диаризации методами машинного обучения  ВМК МГУ.pptx
@@ -6,7 +6,7 @@
     <p:sldMasterId id="2147483660" r:id="rId2"/>
   </p:sldMasterIdLst>
   <p:notesMasterIdLst>
-    <p:notesMasterId r:id="rId16"/>
+    <p:notesMasterId r:id="rId17"/>
   </p:notesMasterIdLst>
   <p:sldIdLst>
     <p:sldId id="256" r:id="rId3"/>
@@ -21,7 +21,8 @@
     <p:sldId id="328" r:id="rId12"/>
     <p:sldId id="329" r:id="rId13"/>
     <p:sldId id="330" r:id="rId14"/>
-    <p:sldId id="326" r:id="rId15"/>
+    <p:sldId id="331" r:id="rId15"/>
+    <p:sldId id="326" r:id="rId16"/>
   </p:sldIdLst>
   <p:sldSz cx="9144000" cy="6858000" type="screen4x3"/>
   <p:notesSz cx="6858000" cy="9144000"/>
@@ -5108,7 +5109,7 @@
             </a:pPr>
             <a:fld id="{5096F4B8-13D7-4351-ADCD-9D33A08E554D}" type="datetime1">
               <a:rPr lang="ru-RU" altLang="ru-RU" smtClean="0"/>
-              <a:t>14.06.2023</a:t>
+              <a:t>25.06.2023</a:t>
             </a:fld>
             <a:endParaRPr lang="ru-RU" altLang="ru-RU"/>
           </a:p>
@@ -5321,7 +5322,7 @@
             </a:pPr>
             <a:fld id="{C680CCAF-07F9-4BFB-963B-CB1970AAC978}" type="datetime1">
               <a:rPr lang="ru-RU" altLang="ru-RU" smtClean="0"/>
-              <a:t>14.06.2023</a:t>
+              <a:t>25.06.2023</a:t>
             </a:fld>
             <a:endParaRPr lang="ru-RU" altLang="ru-RU"/>
           </a:p>
@@ -5504,7 +5505,7 @@
             </a:pPr>
             <a:fld id="{2CC8F8D6-2986-4832-830D-188DEFB7559D}" type="datetime1">
               <a:rPr lang="ru-RU" altLang="ru-RU" smtClean="0"/>
-              <a:t>14.06.2023</a:t>
+              <a:t>25.06.2023</a:t>
             </a:fld>
             <a:endParaRPr lang="ru-RU" altLang="ru-RU"/>
           </a:p>
@@ -5722,7 +5723,7 @@
           <a:p>
             <a:fld id="{CB9171A2-A41B-4AD5-B907-B5B6903F557D}" type="datetime1">
               <a:rPr lang="ru-RU" smtClean="0"/>
-              <a:t>14.06.2023</a:t>
+              <a:t>25.06.2023</a:t>
             </a:fld>
             <a:endParaRPr lang="ru-RU"/>
           </a:p>
@@ -5963,7 +5964,7 @@
           <a:p>
             <a:fld id="{E91ECEA4-D246-4B52-A441-A57669E146E9}" type="datetime1">
               <a:rPr lang="ru-RU" smtClean="0"/>
-              <a:t>14.06.2023</a:t>
+              <a:t>25.06.2023</a:t>
             </a:fld>
             <a:endParaRPr lang="ru-RU"/>
           </a:p>
@@ -6271,7 +6272,7 @@
           <a:p>
             <a:fld id="{C2128463-238E-40FD-A468-51C3E412F10F}" type="datetime1">
               <a:rPr lang="ru-RU" smtClean="0"/>
-              <a:t>14.06.2023</a:t>
+              <a:t>25.06.2023</a:t>
             </a:fld>
             <a:endParaRPr lang="ru-RU"/>
           </a:p>
@@ -6577,7 +6578,7 @@
           <a:p>
             <a:fld id="{0350E20C-E67A-408C-A177-32E667E3E28F}" type="datetime1">
               <a:rPr lang="ru-RU" smtClean="0"/>
-              <a:t>14.06.2023</a:t>
+              <a:t>25.06.2023</a:t>
             </a:fld>
             <a:endParaRPr lang="ru-RU"/>
           </a:p>
@@ -7031,7 +7032,7 @@
           <a:p>
             <a:fld id="{65B913DD-FB04-46AA-8FE6-E7EA379488F8}" type="datetime1">
               <a:rPr lang="ru-RU" smtClean="0"/>
-              <a:t>14.06.2023</a:t>
+              <a:t>25.06.2023</a:t>
             </a:fld>
             <a:endParaRPr lang="ru-RU"/>
           </a:p>
@@ -7207,7 +7208,7 @@
           <a:p>
             <a:fld id="{4B38BCE4-12D0-4DD9-8ECC-9E5A46F14763}" type="datetime1">
               <a:rPr lang="ru-RU" smtClean="0"/>
-              <a:t>14.06.2023</a:t>
+              <a:t>25.06.2023</a:t>
             </a:fld>
             <a:endParaRPr lang="ru-RU"/>
           </a:p>
@@ -7347,7 +7348,7 @@
           <a:p>
             <a:fld id="{69E9C0ED-D7F0-42E9-867B-D65A6D38DF84}" type="datetime1">
               <a:rPr lang="ru-RU" smtClean="0"/>
-              <a:t>14.06.2023</a:t>
+              <a:t>25.06.2023</a:t>
             </a:fld>
             <a:endParaRPr lang="ru-RU"/>
           </a:p>
@@ -7694,7 +7695,7 @@
           <a:p>
             <a:fld id="{FED87961-81ED-4383-A0CA-7290F09B0F93}" type="datetime1">
               <a:rPr lang="ru-RU" smtClean="0"/>
-              <a:t>14.06.2023</a:t>
+              <a:t>25.06.2023</a:t>
             </a:fld>
             <a:endParaRPr lang="ru-RU"/>
           </a:p>
@@ -7902,7 +7903,7 @@
             </a:pPr>
             <a:fld id="{B1D39544-8536-476C-9E00-630C0896AD3B}" type="datetime1">
               <a:rPr lang="ru-RU" altLang="ru-RU" smtClean="0"/>
-              <a:t>14.06.2023</a:t>
+              <a:t>25.06.2023</a:t>
             </a:fld>
             <a:endParaRPr lang="ru-RU" altLang="ru-RU"/>
           </a:p>
@@ -8262,7 +8263,7 @@
           <a:p>
             <a:fld id="{75360F84-B077-4A61-B8B6-BA3D6DEDBB3D}" type="datetime1">
               <a:rPr lang="ru-RU" smtClean="0"/>
-              <a:t>14.06.2023</a:t>
+              <a:t>25.06.2023</a:t>
             </a:fld>
             <a:endParaRPr lang="ru-RU"/>
           </a:p>
@@ -8503,7 +8504,7 @@
           <a:p>
             <a:fld id="{4533F3BD-E919-4699-BAAD-D1C06628442F}" type="datetime1">
               <a:rPr lang="ru-RU" smtClean="0"/>
-              <a:t>14.06.2023</a:t>
+              <a:t>25.06.2023</a:t>
             </a:fld>
             <a:endParaRPr lang="ru-RU"/>
           </a:p>
@@ -8744,7 +8745,7 @@
           <a:p>
             <a:fld id="{3716F90C-1E7F-453E-B8CD-42ACED6DA527}" type="datetime1">
               <a:rPr lang="ru-RU" smtClean="0"/>
-              <a:t>14.06.2023</a:t>
+              <a:t>25.06.2023</a:t>
             </a:fld>
             <a:endParaRPr lang="ru-RU"/>
           </a:p>
@@ -8975,7 +8976,7 @@
             </a:pPr>
             <a:fld id="{2A29BCFA-F4E6-4C41-8E35-775CE9064CCE}" type="datetime1">
               <a:rPr lang="ru-RU" altLang="ru-RU" smtClean="0"/>
-              <a:t>14.06.2023</a:t>
+              <a:t>25.06.2023</a:t>
             </a:fld>
             <a:endParaRPr lang="ru-RU" altLang="ru-RU"/>
           </a:p>
@@ -9336,7 +9337,7 @@
             </a:pPr>
             <a:fld id="{5C253F71-3C55-4A41-AF59-E268253328C6}" type="datetime1">
               <a:rPr lang="ru-RU" altLang="ru-RU" smtClean="0"/>
-              <a:t>14.06.2023</a:t>
+              <a:t>25.06.2023</a:t>
             </a:fld>
             <a:endParaRPr lang="ru-RU" altLang="ru-RU"/>
           </a:p>
@@ -9765,7 +9766,7 @@
             </a:pPr>
             <a:fld id="{F5F6DC50-8B92-49C1-992B-235D2D402D9F}" type="datetime1">
               <a:rPr lang="ru-RU" altLang="ru-RU" smtClean="0"/>
-              <a:t>14.06.2023</a:t>
+              <a:t>25.06.2023</a:t>
             </a:fld>
             <a:endParaRPr lang="ru-RU" altLang="ru-RU"/>
           </a:p>
@@ -9887,7 +9888,7 @@
             </a:pPr>
             <a:fld id="{E7ED2526-990D-484B-938B-09B6D6999CC0}" type="datetime1">
               <a:rPr lang="ru-RU" altLang="ru-RU" smtClean="0"/>
-              <a:t>14.06.2023</a:t>
+              <a:t>25.06.2023</a:t>
             </a:fld>
             <a:endParaRPr lang="ru-RU" altLang="ru-RU"/>
           </a:p>
@@ -9987,7 +9988,7 @@
             </a:pPr>
             <a:fld id="{891285C7-2116-4841-8017-F4CE9F8C8F67}" type="datetime1">
               <a:rPr lang="ru-RU" altLang="ru-RU" smtClean="0"/>
-              <a:t>14.06.2023</a:t>
+              <a:t>25.06.2023</a:t>
             </a:fld>
             <a:endParaRPr lang="ru-RU" altLang="ru-RU" dirty="0"/>
           </a:p>
@@ -10267,7 +10268,7 @@
             </a:pPr>
             <a:fld id="{205690AC-8251-4E5B-A0F1-8FA5AB702FC4}" type="datetime1">
               <a:rPr lang="ru-RU" altLang="ru-RU" smtClean="0"/>
-              <a:t>14.06.2023</a:t>
+              <a:t>25.06.2023</a:t>
             </a:fld>
             <a:endParaRPr lang="ru-RU" altLang="ru-RU"/>
           </a:p>
@@ -10525,7 +10526,7 @@
             </a:pPr>
             <a:fld id="{725C88B2-0439-41B8-A09D-32376C62892B}" type="datetime1">
               <a:rPr lang="ru-RU" altLang="ru-RU" smtClean="0"/>
-              <a:t>14.06.2023</a:t>
+              <a:t>25.06.2023</a:t>
             </a:fld>
             <a:endParaRPr lang="ru-RU" altLang="ru-RU"/>
           </a:p>
@@ -10706,7 +10707,7 @@
             </a:pPr>
             <a:fld id="{58D5BA84-7BD9-4952-8131-9BAD1DE9C1E6}" type="datetime1">
               <a:rPr lang="ru-RU" altLang="ru-RU" smtClean="0"/>
-              <a:t>14.06.2023</a:t>
+              <a:t>25.06.2023</a:t>
             </a:fld>
             <a:endParaRPr lang="ru-RU" altLang="ru-RU"/>
           </a:p>
@@ -14204,14 +14205,122 @@
         </p:blipFill>
         <p:spPr>
           <a:xfrm>
-            <a:off x="0" y="1627067"/>
-            <a:ext cx="9144000" cy="3603866"/>
+            <a:off x="230817" y="3924176"/>
+            <a:ext cx="8044193" cy="2466502"/>
           </a:xfrm>
           <a:prstGeom prst="rect">
             <a:avLst/>
           </a:prstGeom>
         </p:spPr>
       </p:pic>
+      <p:pic>
+        <p:nvPicPr>
+          <p:cNvPr id="12" name="Рисунок 11">
+            <a:extLst>
+              <a:ext uri="{FF2B5EF4-FFF2-40B4-BE49-F238E27FC236}">
+                <a16:creationId xmlns:a16="http://schemas.microsoft.com/office/drawing/2014/main" id="{1859F397-A5B3-45E3-87AB-B8F733B58BE8}"/>
+              </a:ext>
+            </a:extLst>
+          </p:cNvPr>
+          <p:cNvPicPr/>
+          <p:nvPr/>
+        </p:nvPicPr>
+        <p:blipFill>
+          <a:blip r:embed="rId3"/>
+          <a:stretch>
+            <a:fillRect/>
+          </a:stretch>
+        </p:blipFill>
+        <p:spPr>
+          <a:xfrm>
+            <a:off x="230817" y="1520017"/>
+            <a:ext cx="8044193" cy="2232248"/>
+          </a:xfrm>
+          <a:prstGeom prst="rect">
+            <a:avLst/>
+          </a:prstGeom>
+        </p:spPr>
+      </p:pic>
+      <p:sp>
+        <p:nvSpPr>
+          <p:cNvPr id="14" name="TextBox 13">
+            <a:extLst>
+              <a:ext uri="{FF2B5EF4-FFF2-40B4-BE49-F238E27FC236}">
+                <a16:creationId xmlns:a16="http://schemas.microsoft.com/office/drawing/2014/main" id="{14F3ACB2-25CC-419D-BE6D-B6FADB644A97}"/>
+              </a:ext>
+            </a:extLst>
+          </p:cNvPr>
+          <p:cNvSpPr txBox="1"/>
+          <p:nvPr/>
+        </p:nvSpPr>
+        <p:spPr>
+          <a:xfrm>
+            <a:off x="632263" y="1115452"/>
+            <a:ext cx="3960440" cy="369332"/>
+          </a:xfrm>
+          <a:prstGeom prst="rect">
+            <a:avLst/>
+          </a:prstGeom>
+          <a:noFill/>
+        </p:spPr>
+        <p:txBody>
+          <a:bodyPr wrap="square">
+            <a:spAutoFit/>
+          </a:bodyPr>
+          <a:lstStyle/>
+          <a:p>
+            <a:r>
+              <a:rPr lang="ru-RU" dirty="0">
+                <a:solidFill>
+                  <a:srgbClr val="1000CC"/>
+                </a:solidFill>
+              </a:rPr>
+              <a:t>Результат анализа одного диктора</a:t>
+            </a:r>
+            <a:endParaRPr lang="ru-RU" dirty="0"/>
+          </a:p>
+        </p:txBody>
+      </p:sp>
+      <p:sp>
+        <p:nvSpPr>
+          <p:cNvPr id="15" name="TextBox 14">
+            <a:extLst>
+              <a:ext uri="{FF2B5EF4-FFF2-40B4-BE49-F238E27FC236}">
+                <a16:creationId xmlns:a16="http://schemas.microsoft.com/office/drawing/2014/main" id="{5B6AD9B2-0D52-4FBC-ABD3-0A9EA3E06BA6}"/>
+              </a:ext>
+            </a:extLst>
+          </p:cNvPr>
+          <p:cNvSpPr txBox="1"/>
+          <p:nvPr/>
+        </p:nvSpPr>
+        <p:spPr>
+          <a:xfrm>
+            <a:off x="611560" y="3547626"/>
+            <a:ext cx="3960440" cy="369332"/>
+          </a:xfrm>
+          <a:prstGeom prst="rect">
+            <a:avLst/>
+          </a:prstGeom>
+          <a:noFill/>
+        </p:spPr>
+        <p:txBody>
+          <a:bodyPr wrap="square">
+            <a:spAutoFit/>
+          </a:bodyPr>
+          <a:lstStyle/>
+          <a:p>
+            <a:r>
+              <a:rPr lang="ru-RU" dirty="0">
+                <a:solidFill>
+                  <a:srgbClr val="1000CC"/>
+                </a:solidFill>
+              </a:rPr>
+              <a:t>Результат анализа двух дикторов</a:t>
+            </a:r>
+            <a:endParaRPr lang="ru-RU" dirty="0"/>
+          </a:p>
+        </p:txBody>
+      </p:sp>
     </p:spTree>
     <p:extLst>
       <p:ext uri="{BB962C8B-B14F-4D97-AF65-F5344CB8AC3E}">
@@ -14226,6 +14335,466 @@
 </file>
 
 <file path=ppt/slides/slide13.xml><?xml version="1.0" encoding="utf-8"?>
+<p:sld xmlns:a="http://schemas.openxmlformats.org/drawingml/2006/main" xmlns:r="http://schemas.openxmlformats.org/officeDocument/2006/relationships" xmlns:p="http://schemas.openxmlformats.org/presentationml/2006/main">
+  <p:cSld>
+    <p:spTree>
+      <p:nvGrpSpPr>
+        <p:cNvPr id="1" name=""/>
+        <p:cNvGrpSpPr/>
+        <p:nvPr/>
+      </p:nvGrpSpPr>
+      <p:grpSpPr>
+        <a:xfrm>
+          <a:off x="0" y="0"/>
+          <a:ext cx="0" cy="0"/>
+          <a:chOff x="0" y="0"/>
+          <a:chExt cx="0" cy="0"/>
+        </a:xfrm>
+      </p:grpSpPr>
+      <p:sp>
+        <p:nvSpPr>
+          <p:cNvPr id="3" name="object 2">
+            <a:extLst>
+              <a:ext uri="{FF2B5EF4-FFF2-40B4-BE49-F238E27FC236}">
+                <a16:creationId xmlns:a16="http://schemas.microsoft.com/office/drawing/2014/main" id="{AA738A48-FDC4-4C23-BAFB-AEC2FA4348DC}"/>
+              </a:ext>
+            </a:extLst>
+          </p:cNvPr>
+          <p:cNvSpPr txBox="1">
+            <a:spLocks/>
+          </p:cNvSpPr>
+          <p:nvPr/>
+        </p:nvSpPr>
+        <p:spPr bwMode="auto">
+          <a:xfrm>
+            <a:off x="971600" y="314110"/>
+            <a:ext cx="6359525" cy="1106487"/>
+          </a:xfrm>
+          <a:prstGeom prst="rect">
+            <a:avLst/>
+          </a:prstGeom>
+          <a:noFill/>
+          <a:ln>
+            <a:noFill/>
+          </a:ln>
+          <a:effectLst/>
+        </p:spPr>
+        <p:txBody>
+          <a:bodyPr vert="horz" wrap="square" lIns="92160" tIns="46080" rIns="92160" bIns="46080" numCol="1" rtlCol="0" anchor="ctr" anchorCtr="1" compatLnSpc="1">
+            <a:prstTxWarp prst="textNoShape">
+              <a:avLst/>
+            </a:prstTxWarp>
+            <a:normAutofit/>
+          </a:bodyPr>
+          <a:lstStyle>
+            <a:lvl1pPr algn="l" defTabSz="449263" rtl="0" eaLnBrk="0" fontAlgn="base" hangingPunct="0">
+              <a:lnSpc>
+                <a:spcPct val="89000"/>
+              </a:lnSpc>
+              <a:spcBef>
+                <a:spcPct val="0"/>
+              </a:spcBef>
+              <a:spcAft>
+                <a:spcPct val="0"/>
+              </a:spcAft>
+              <a:buClr>
+                <a:srgbClr val="000000"/>
+              </a:buClr>
+              <a:buSzPct val="100000"/>
+              <a:buFont typeface="Times New Roman" pitchFamily="16" charset="0"/>
+              <a:defRPr sz="2600">
+                <a:solidFill>
+                  <a:srgbClr val="3905CD"/>
+                </a:solidFill>
+                <a:latin typeface="+mj-lt"/>
+                <a:ea typeface="+mj-ea"/>
+                <a:cs typeface="+mj-cs"/>
+              </a:defRPr>
+            </a:lvl1pPr>
+            <a:lvl2pPr algn="l" defTabSz="449263" rtl="0" eaLnBrk="0" fontAlgn="base" hangingPunct="0">
+              <a:lnSpc>
+                <a:spcPct val="89000"/>
+              </a:lnSpc>
+              <a:spcBef>
+                <a:spcPct val="0"/>
+              </a:spcBef>
+              <a:spcAft>
+                <a:spcPct val="0"/>
+              </a:spcAft>
+              <a:buClr>
+                <a:srgbClr val="000000"/>
+              </a:buClr>
+              <a:buSzPct val="100000"/>
+              <a:buFont typeface="Times New Roman" pitchFamily="16" charset="0"/>
+              <a:defRPr sz="2600">
+                <a:solidFill>
+                  <a:srgbClr val="3905CD"/>
+                </a:solidFill>
+                <a:latin typeface="Arial" charset="0"/>
+                <a:ea typeface="Microsoft YaHei" charset="-122"/>
+              </a:defRPr>
+            </a:lvl2pPr>
+            <a:lvl3pPr algn="l" defTabSz="449263" rtl="0" eaLnBrk="0" fontAlgn="base" hangingPunct="0">
+              <a:lnSpc>
+                <a:spcPct val="89000"/>
+              </a:lnSpc>
+              <a:spcBef>
+                <a:spcPct val="0"/>
+              </a:spcBef>
+              <a:spcAft>
+                <a:spcPct val="0"/>
+              </a:spcAft>
+              <a:buClr>
+                <a:srgbClr val="000000"/>
+              </a:buClr>
+              <a:buSzPct val="100000"/>
+              <a:buFont typeface="Times New Roman" pitchFamily="16" charset="0"/>
+              <a:defRPr sz="2600">
+                <a:solidFill>
+                  <a:srgbClr val="3905CD"/>
+                </a:solidFill>
+                <a:latin typeface="Arial" charset="0"/>
+                <a:ea typeface="Microsoft YaHei" charset="-122"/>
+              </a:defRPr>
+            </a:lvl3pPr>
+            <a:lvl4pPr algn="l" defTabSz="449263" rtl="0" eaLnBrk="0" fontAlgn="base" hangingPunct="0">
+              <a:lnSpc>
+                <a:spcPct val="89000"/>
+              </a:lnSpc>
+              <a:spcBef>
+                <a:spcPct val="0"/>
+              </a:spcBef>
+              <a:spcAft>
+                <a:spcPct val="0"/>
+              </a:spcAft>
+              <a:buClr>
+                <a:srgbClr val="000000"/>
+              </a:buClr>
+              <a:buSzPct val="100000"/>
+              <a:buFont typeface="Times New Roman" pitchFamily="16" charset="0"/>
+              <a:defRPr sz="2600">
+                <a:solidFill>
+                  <a:srgbClr val="3905CD"/>
+                </a:solidFill>
+                <a:latin typeface="Arial" charset="0"/>
+                <a:ea typeface="Microsoft YaHei" charset="-122"/>
+              </a:defRPr>
+            </a:lvl4pPr>
+            <a:lvl5pPr algn="l" defTabSz="449263" rtl="0" eaLnBrk="0" fontAlgn="base" hangingPunct="0">
+              <a:lnSpc>
+                <a:spcPct val="89000"/>
+              </a:lnSpc>
+              <a:spcBef>
+                <a:spcPct val="0"/>
+              </a:spcBef>
+              <a:spcAft>
+                <a:spcPct val="0"/>
+              </a:spcAft>
+              <a:buClr>
+                <a:srgbClr val="000000"/>
+              </a:buClr>
+              <a:buSzPct val="100000"/>
+              <a:buFont typeface="Times New Roman" pitchFamily="16" charset="0"/>
+              <a:defRPr sz="2600">
+                <a:solidFill>
+                  <a:srgbClr val="3905CD"/>
+                </a:solidFill>
+                <a:latin typeface="Arial" charset="0"/>
+                <a:ea typeface="Microsoft YaHei" charset="-122"/>
+              </a:defRPr>
+            </a:lvl5pPr>
+            <a:lvl6pPr marL="2514600" indent="-228600" algn="l" defTabSz="449263" rtl="0" eaLnBrk="0" fontAlgn="base" hangingPunct="0">
+              <a:lnSpc>
+                <a:spcPct val="89000"/>
+              </a:lnSpc>
+              <a:spcBef>
+                <a:spcPct val="0"/>
+              </a:spcBef>
+              <a:spcAft>
+                <a:spcPct val="0"/>
+              </a:spcAft>
+              <a:buClr>
+                <a:srgbClr val="000000"/>
+              </a:buClr>
+              <a:buSzPct val="100000"/>
+              <a:buFont typeface="Times New Roman" pitchFamily="16" charset="0"/>
+              <a:defRPr sz="2600">
+                <a:solidFill>
+                  <a:srgbClr val="3905CD"/>
+                </a:solidFill>
+                <a:latin typeface="Arial" charset="0"/>
+                <a:ea typeface="Microsoft YaHei" charset="-122"/>
+              </a:defRPr>
+            </a:lvl6pPr>
+            <a:lvl7pPr marL="2971800" indent="-228600" algn="l" defTabSz="449263" rtl="0" eaLnBrk="0" fontAlgn="base" hangingPunct="0">
+              <a:lnSpc>
+                <a:spcPct val="89000"/>
+              </a:lnSpc>
+              <a:spcBef>
+                <a:spcPct val="0"/>
+              </a:spcBef>
+              <a:spcAft>
+                <a:spcPct val="0"/>
+              </a:spcAft>
+              <a:buClr>
+                <a:srgbClr val="000000"/>
+              </a:buClr>
+              <a:buSzPct val="100000"/>
+              <a:buFont typeface="Times New Roman" pitchFamily="16" charset="0"/>
+              <a:defRPr sz="2600">
+                <a:solidFill>
+                  <a:srgbClr val="3905CD"/>
+                </a:solidFill>
+                <a:latin typeface="Arial" charset="0"/>
+                <a:ea typeface="Microsoft YaHei" charset="-122"/>
+              </a:defRPr>
+            </a:lvl7pPr>
+            <a:lvl8pPr marL="3429000" indent="-228600" algn="l" defTabSz="449263" rtl="0" eaLnBrk="0" fontAlgn="base" hangingPunct="0">
+              <a:lnSpc>
+                <a:spcPct val="89000"/>
+              </a:lnSpc>
+              <a:spcBef>
+                <a:spcPct val="0"/>
+              </a:spcBef>
+              <a:spcAft>
+                <a:spcPct val="0"/>
+              </a:spcAft>
+              <a:buClr>
+                <a:srgbClr val="000000"/>
+              </a:buClr>
+              <a:buSzPct val="100000"/>
+              <a:buFont typeface="Times New Roman" pitchFamily="16" charset="0"/>
+              <a:defRPr sz="2600">
+                <a:solidFill>
+                  <a:srgbClr val="3905CD"/>
+                </a:solidFill>
+                <a:latin typeface="Arial" charset="0"/>
+                <a:ea typeface="Microsoft YaHei" charset="-122"/>
+              </a:defRPr>
+            </a:lvl8pPr>
+            <a:lvl9pPr marL="3886200" indent="-228600" algn="l" defTabSz="449263" rtl="0" eaLnBrk="0" fontAlgn="base" hangingPunct="0">
+              <a:lnSpc>
+                <a:spcPct val="89000"/>
+              </a:lnSpc>
+              <a:spcBef>
+                <a:spcPct val="0"/>
+              </a:spcBef>
+              <a:spcAft>
+                <a:spcPct val="0"/>
+              </a:spcAft>
+              <a:buClr>
+                <a:srgbClr val="000000"/>
+              </a:buClr>
+              <a:buSzPct val="100000"/>
+              <a:buFont typeface="Times New Roman" pitchFamily="16" charset="0"/>
+              <a:defRPr sz="2600">
+                <a:solidFill>
+                  <a:srgbClr val="3905CD"/>
+                </a:solidFill>
+                <a:latin typeface="Arial" charset="0"/>
+                <a:ea typeface="Microsoft YaHei" charset="-122"/>
+              </a:defRPr>
+            </a:lvl9pPr>
+          </a:lstStyle>
+          <a:p>
+            <a:r>
+              <a:rPr lang="ru-RU" b="1" kern="0" dirty="0"/>
+              <a:t>Результаты работы</a:t>
+            </a:r>
+          </a:p>
+        </p:txBody>
+      </p:sp>
+      <p:sp>
+        <p:nvSpPr>
+          <p:cNvPr id="7" name="Нижний колонтитул 6">
+            <a:extLst>
+              <a:ext uri="{FF2B5EF4-FFF2-40B4-BE49-F238E27FC236}">
+                <a16:creationId xmlns:a16="http://schemas.microsoft.com/office/drawing/2014/main" id="{51693622-95B7-4C56-B982-5C9648384C33}"/>
+              </a:ext>
+            </a:extLst>
+          </p:cNvPr>
+          <p:cNvSpPr>
+            <a:spLocks noGrp="1"/>
+          </p:cNvSpPr>
+          <p:nvPr>
+            <p:ph type="ftr" sz="quarter" idx="11"/>
+          </p:nvPr>
+        </p:nvSpPr>
+        <p:spPr>
+          <a:xfrm>
+            <a:off x="3028950" y="6356350"/>
+            <a:ext cx="2839194" cy="365125"/>
+          </a:xfrm>
+        </p:spPr>
+        <p:txBody>
+          <a:bodyPr/>
+          <a:lstStyle/>
+          <a:p>
+            <a:r>
+              <a:rPr lang="ru-RU" sz="1400" dirty="0">
+                <a:solidFill>
+                  <a:srgbClr val="5332D7"/>
+                </a:solidFill>
+              </a:rPr>
+              <a:t>© факультет ВМК МГУ, 2023г.</a:t>
+            </a:r>
+          </a:p>
+        </p:txBody>
+      </p:sp>
+      <p:pic>
+        <p:nvPicPr>
+          <p:cNvPr id="6" name="Рисунок 5">
+            <a:extLst>
+              <a:ext uri="{FF2B5EF4-FFF2-40B4-BE49-F238E27FC236}">
+                <a16:creationId xmlns:a16="http://schemas.microsoft.com/office/drawing/2014/main" id="{45218898-2362-40A2-8B2F-21622E6AB343}"/>
+              </a:ext>
+            </a:extLst>
+          </p:cNvPr>
+          <p:cNvPicPr>
+            <a:picLocks noChangeAspect="1"/>
+          </p:cNvPicPr>
+          <p:nvPr/>
+        </p:nvPicPr>
+        <p:blipFill>
+          <a:blip r:embed="rId2"/>
+          <a:stretch>
+            <a:fillRect/>
+          </a:stretch>
+        </p:blipFill>
+        <p:spPr>
+          <a:xfrm>
+            <a:off x="494871" y="3986466"/>
+            <a:ext cx="8068319" cy="2088232"/>
+          </a:xfrm>
+          <a:prstGeom prst="rect">
+            <a:avLst/>
+          </a:prstGeom>
+        </p:spPr>
+      </p:pic>
+      <p:pic>
+        <p:nvPicPr>
+          <p:cNvPr id="9" name="Рисунок 8">
+            <a:extLst>
+              <a:ext uri="{FF2B5EF4-FFF2-40B4-BE49-F238E27FC236}">
+                <a16:creationId xmlns:a16="http://schemas.microsoft.com/office/drawing/2014/main" id="{052846A0-13A9-47C0-B451-4869EB685C65}"/>
+              </a:ext>
+            </a:extLst>
+          </p:cNvPr>
+          <p:cNvPicPr>
+            <a:picLocks noChangeAspect="1"/>
+          </p:cNvPicPr>
+          <p:nvPr/>
+        </p:nvPicPr>
+        <p:blipFill>
+          <a:blip r:embed="rId3"/>
+          <a:stretch>
+            <a:fillRect/>
+          </a:stretch>
+        </p:blipFill>
+        <p:spPr>
+          <a:xfrm>
+            <a:off x="414387" y="1542741"/>
+            <a:ext cx="8396043" cy="2246299"/>
+          </a:xfrm>
+          <a:prstGeom prst="rect">
+            <a:avLst/>
+          </a:prstGeom>
+        </p:spPr>
+      </p:pic>
+      <p:sp>
+        <p:nvSpPr>
+          <p:cNvPr id="10" name="TextBox 9">
+            <a:extLst>
+              <a:ext uri="{FF2B5EF4-FFF2-40B4-BE49-F238E27FC236}">
+                <a16:creationId xmlns:a16="http://schemas.microsoft.com/office/drawing/2014/main" id="{648EB8FF-1A8C-4D8C-9B91-664455C47EE4}"/>
+              </a:ext>
+            </a:extLst>
+          </p:cNvPr>
+          <p:cNvSpPr txBox="1"/>
+          <p:nvPr/>
+        </p:nvSpPr>
+        <p:spPr>
+          <a:xfrm>
+            <a:off x="494871" y="3701360"/>
+            <a:ext cx="4235224" cy="369332"/>
+          </a:xfrm>
+          <a:prstGeom prst="rect">
+            <a:avLst/>
+          </a:prstGeom>
+          <a:noFill/>
+        </p:spPr>
+        <p:txBody>
+          <a:bodyPr wrap="square">
+            <a:spAutoFit/>
+          </a:bodyPr>
+          <a:lstStyle/>
+          <a:p>
+            <a:r>
+              <a:rPr lang="ru-RU" dirty="0">
+                <a:solidFill>
+                  <a:srgbClr val="1000CC"/>
+                </a:solidFill>
+              </a:rPr>
+              <a:t>Результат анализа четырёх дикторов</a:t>
+            </a:r>
+            <a:endParaRPr lang="ru-RU" dirty="0"/>
+          </a:p>
+        </p:txBody>
+      </p:sp>
+      <p:sp>
+        <p:nvSpPr>
+          <p:cNvPr id="11" name="TextBox 10">
+            <a:extLst>
+              <a:ext uri="{FF2B5EF4-FFF2-40B4-BE49-F238E27FC236}">
+                <a16:creationId xmlns:a16="http://schemas.microsoft.com/office/drawing/2014/main" id="{4ADE2B16-7E0D-40D6-9F11-D0FF2BD4308D}"/>
+              </a:ext>
+            </a:extLst>
+          </p:cNvPr>
+          <p:cNvSpPr txBox="1"/>
+          <p:nvPr/>
+        </p:nvSpPr>
+        <p:spPr>
+          <a:xfrm>
+            <a:off x="632263" y="1115452"/>
+            <a:ext cx="3960440" cy="369332"/>
+          </a:xfrm>
+          <a:prstGeom prst="rect">
+            <a:avLst/>
+          </a:prstGeom>
+          <a:noFill/>
+        </p:spPr>
+        <p:txBody>
+          <a:bodyPr wrap="square">
+            <a:spAutoFit/>
+          </a:bodyPr>
+          <a:lstStyle/>
+          <a:p>
+            <a:r>
+              <a:rPr lang="ru-RU" dirty="0">
+                <a:solidFill>
+                  <a:srgbClr val="1000CC"/>
+                </a:solidFill>
+              </a:rPr>
+              <a:t>Результат анализа трех дикторов</a:t>
+            </a:r>
+            <a:endParaRPr lang="ru-RU" dirty="0"/>
+          </a:p>
+        </p:txBody>
+      </p:sp>
+    </p:spTree>
+    <p:extLst>
+      <p:ext uri="{BB962C8B-B14F-4D97-AF65-F5344CB8AC3E}">
+        <p14:creationId xmlns:p14="http://schemas.microsoft.com/office/powerpoint/2010/main" val="1334137299"/>
+      </p:ext>
+    </p:extLst>
+  </p:cSld>
+  <p:clrMapOvr>
+    <a:masterClrMapping/>
+  </p:clrMapOvr>
+</p:sld>
+</file>
+
+<file path=ppt/slides/slide14.xml><?xml version="1.0" encoding="utf-8"?>
 <p:sld xmlns:a="http://schemas.openxmlformats.org/drawingml/2006/main" xmlns:r="http://schemas.openxmlformats.org/officeDocument/2006/relationships" xmlns:p="http://schemas.openxmlformats.org/presentationml/2006/main">
   <p:cSld>
     <p:spTree>

</xml_diff>